<commit_message>
Added new set of learning objectives to README.
</commit_message>
<xml_diff>
--- a/presentations/data_vocabulary.pptx
+++ b/presentations/data_vocabulary.pptx
@@ -222,7 +222,7 @@
           <a:p>
             <a:fld id="{FD93C9B2-20F6-4DB1-B471-224337D0AC79}" type="datetimeFigureOut">
               <a:rPr lang="en-US" smtClean="0"/>
-              <a:t>8/29/2022</a:t>
+              <a:t>12/6/2022</a:t>
             </a:fld>
             <a:endParaRPr lang="en-US"/>
           </a:p>
@@ -1676,6 +1676,14 @@
           <a:bodyPr/>
           <a:lstStyle/>
           <a:p>
+            <a:r>
+              <a:rPr lang="en-US" dirty="0">
+                <a:latin typeface="+mn-lt"/>
+              </a:rPr>
+              <a:t>A single number is said to be atomic.  </a:t>
+            </a:r>
+          </a:p>
+          <a:p>
             <a:endParaRPr lang="en-US" dirty="0">
               <a:latin typeface="+mn-lt"/>
             </a:endParaRPr>
@@ -1685,8 +1693,17 @@
               <a:rPr lang="en-US" dirty="0">
                 <a:latin typeface="+mn-lt"/>
               </a:rPr>
-              <a:t>v</a:t>
-            </a:r>
+              <a:t>In machine learning, a vector is a list of numbers.  The more precise mathematical definition states that </a:t>
+            </a:r>
+            <a:r>
+              <a:rPr lang="en-US">
+                <a:latin typeface="+mn-lt"/>
+              </a:rPr>
+              <a:t>a vector  </a:t>
+            </a:r>
+            <a:endParaRPr lang="en-US" dirty="0">
+              <a:latin typeface="+mn-lt"/>
+            </a:endParaRPr>
           </a:p>
           <a:p>
             <a:endParaRPr lang="en-US" dirty="0">
@@ -2577,7 +2594,7 @@
           <a:p>
             <a:fld id="{C3F78080-8D0A-4BE8-A5B4-CB115102D524}" type="datetimeFigureOut">
               <a:rPr lang="en-US" smtClean="0"/>
-              <a:t>8/29/2022</a:t>
+              <a:t>12/6/2022</a:t>
             </a:fld>
             <a:endParaRPr lang="en-US"/>
           </a:p>
@@ -2775,7 +2792,7 @@
           <a:p>
             <a:fld id="{C3F78080-8D0A-4BE8-A5B4-CB115102D524}" type="datetimeFigureOut">
               <a:rPr lang="en-US" smtClean="0"/>
-              <a:t>8/29/2022</a:t>
+              <a:t>12/6/2022</a:t>
             </a:fld>
             <a:endParaRPr lang="en-US"/>
           </a:p>
@@ -2983,7 +3000,7 @@
           <a:p>
             <a:fld id="{C3F78080-8D0A-4BE8-A5B4-CB115102D524}" type="datetimeFigureOut">
               <a:rPr lang="en-US" smtClean="0"/>
-              <a:t>8/29/2022</a:t>
+              <a:t>12/6/2022</a:t>
             </a:fld>
             <a:endParaRPr lang="en-US"/>
           </a:p>
@@ -3181,7 +3198,7 @@
           <a:p>
             <a:fld id="{C3F78080-8D0A-4BE8-A5B4-CB115102D524}" type="datetimeFigureOut">
               <a:rPr lang="en-US" smtClean="0"/>
-              <a:t>8/29/2022</a:t>
+              <a:t>12/6/2022</a:t>
             </a:fld>
             <a:endParaRPr lang="en-US"/>
           </a:p>
@@ -3456,7 +3473,7 @@
           <a:p>
             <a:fld id="{C3F78080-8D0A-4BE8-A5B4-CB115102D524}" type="datetimeFigureOut">
               <a:rPr lang="en-US" smtClean="0"/>
-              <a:t>8/29/2022</a:t>
+              <a:t>12/6/2022</a:t>
             </a:fld>
             <a:endParaRPr lang="en-US"/>
           </a:p>
@@ -3721,7 +3738,7 @@
           <a:p>
             <a:fld id="{C3F78080-8D0A-4BE8-A5B4-CB115102D524}" type="datetimeFigureOut">
               <a:rPr lang="en-US" smtClean="0"/>
-              <a:t>8/29/2022</a:t>
+              <a:t>12/6/2022</a:t>
             </a:fld>
             <a:endParaRPr lang="en-US"/>
           </a:p>
@@ -4133,7 +4150,7 @@
           <a:p>
             <a:fld id="{C3F78080-8D0A-4BE8-A5B4-CB115102D524}" type="datetimeFigureOut">
               <a:rPr lang="en-US" smtClean="0"/>
-              <a:t>8/29/2022</a:t>
+              <a:t>12/6/2022</a:t>
             </a:fld>
             <a:endParaRPr lang="en-US"/>
           </a:p>
@@ -4274,7 +4291,7 @@
           <a:p>
             <a:fld id="{C3F78080-8D0A-4BE8-A5B4-CB115102D524}" type="datetimeFigureOut">
               <a:rPr lang="en-US" smtClean="0"/>
-              <a:t>8/29/2022</a:t>
+              <a:t>12/6/2022</a:t>
             </a:fld>
             <a:endParaRPr lang="en-US"/>
           </a:p>
@@ -4387,7 +4404,7 @@
           <a:p>
             <a:fld id="{C3F78080-8D0A-4BE8-A5B4-CB115102D524}" type="datetimeFigureOut">
               <a:rPr lang="en-US" smtClean="0"/>
-              <a:t>8/29/2022</a:t>
+              <a:t>12/6/2022</a:t>
             </a:fld>
             <a:endParaRPr lang="en-US"/>
           </a:p>
@@ -4698,7 +4715,7 @@
           <a:p>
             <a:fld id="{C3F78080-8D0A-4BE8-A5B4-CB115102D524}" type="datetimeFigureOut">
               <a:rPr lang="en-US" smtClean="0"/>
-              <a:t>8/29/2022</a:t>
+              <a:t>12/6/2022</a:t>
             </a:fld>
             <a:endParaRPr lang="en-US"/>
           </a:p>
@@ -4986,7 +5003,7 @@
           <a:p>
             <a:fld id="{C3F78080-8D0A-4BE8-A5B4-CB115102D524}" type="datetimeFigureOut">
               <a:rPr lang="en-US" smtClean="0"/>
-              <a:t>8/29/2022</a:t>
+              <a:t>12/6/2022</a:t>
             </a:fld>
             <a:endParaRPr lang="en-US"/>
           </a:p>
@@ -5227,7 +5244,7 @@
           <a:p>
             <a:fld id="{C3F78080-8D0A-4BE8-A5B4-CB115102D524}" type="datetimeFigureOut">
               <a:rPr lang="en-US" smtClean="0"/>
-              <a:t>8/29/2022</a:t>
+              <a:t>12/6/2022</a:t>
             </a:fld>
             <a:endParaRPr lang="en-US"/>
           </a:p>
@@ -8352,8 +8369,8 @@
         </p:nvSpPr>
         <p:spPr>
           <a:xfrm>
-            <a:off x="1" y="1386840"/>
-            <a:ext cx="12192000" cy="4790124"/>
+            <a:off x="0" y="3048917"/>
+            <a:ext cx="12192000" cy="760165"/>
           </a:xfrm>
         </p:spPr>
         <p:txBody>
@@ -8361,30 +8378,6 @@
             <a:normAutofit/>
           </a:bodyPr>
           <a:lstStyle/>
-          <a:p>
-            <a:pPr marL="0" indent="0">
-              <a:buNone/>
-            </a:pPr>
-            <a:endParaRPr lang="en-US" dirty="0">
-              <a:latin typeface="Palatino Linotype" panose="02040502050505030304" pitchFamily="18" charset="0"/>
-            </a:endParaRPr>
-          </a:p>
-          <a:p>
-            <a:pPr marL="0" indent="0">
-              <a:buNone/>
-            </a:pPr>
-            <a:endParaRPr lang="en-US" dirty="0">
-              <a:latin typeface="Palatino Linotype" panose="02040502050505030304" pitchFamily="18" charset="0"/>
-            </a:endParaRPr>
-          </a:p>
-          <a:p>
-            <a:pPr marL="0" indent="0">
-              <a:buNone/>
-            </a:pPr>
-            <a:endParaRPr lang="en-US" dirty="0">
-              <a:latin typeface="Palatino Linotype" panose="02040502050505030304" pitchFamily="18" charset="0"/>
-            </a:endParaRPr>
-          </a:p>
           <a:p>
             <a:pPr marL="0" indent="0" algn="ctr">
               <a:buNone/>

</xml_diff>